<commit_message>
update presentation ppt for sprint 2
</commit_message>
<xml_diff>
--- a/sprint-presentations/sprint2.pptx
+++ b/sprint-presentations/sprint2.pptx
@@ -3813,7 +3813,7 @@
           <p:cNvPr id="2" name="Title 1">
             <a:extLst>
               <a:ext uri="{FF2B5EF4-FFF2-40B4-BE49-F238E27FC236}">
-                <a16:creationId xmlns:a16="http://schemas.microsoft.com/office/drawing/2014/main" xmlns="" id="{80C41A42-3B7E-4010-B666-E7DE62653427}"/>
+                <a16:creationId xmlns="" xmlns:a16="http://schemas.microsoft.com/office/drawing/2014/main" id="{80C41A42-3B7E-4010-B666-E7DE62653427}"/>
               </a:ext>
             </a:extLst>
           </p:cNvPr>
@@ -3853,7 +3853,7 @@
           <p:cNvPr id="3" name="Subtitle 2">
             <a:extLst>
               <a:ext uri="{FF2B5EF4-FFF2-40B4-BE49-F238E27FC236}">
-                <a16:creationId xmlns:a16="http://schemas.microsoft.com/office/drawing/2014/main" xmlns="" id="{ED6E8AD0-9B5C-4CFF-B6F6-1074F8584E5E}"/>
+                <a16:creationId xmlns="" xmlns:a16="http://schemas.microsoft.com/office/drawing/2014/main" id="{ED6E8AD0-9B5C-4CFF-B6F6-1074F8584E5E}"/>
               </a:ext>
             </a:extLst>
           </p:cNvPr>
@@ -3950,7 +3950,7 @@
           <p:cNvPr id="2" name="Title 1">
             <a:extLst>
               <a:ext uri="{FF2B5EF4-FFF2-40B4-BE49-F238E27FC236}">
-                <a16:creationId xmlns:a16="http://schemas.microsoft.com/office/drawing/2014/main" xmlns="" id="{6202370A-4359-4084-B0EC-8E99B7D2B670}"/>
+                <a16:creationId xmlns="" xmlns:a16="http://schemas.microsoft.com/office/drawing/2014/main" id="{6202370A-4359-4084-B0EC-8E99B7D2B670}"/>
               </a:ext>
             </a:extLst>
           </p:cNvPr>
@@ -3978,7 +3978,7 @@
           <p:cNvPr id="3" name="Content Placeholder 2">
             <a:extLst>
               <a:ext uri="{FF2B5EF4-FFF2-40B4-BE49-F238E27FC236}">
-                <a16:creationId xmlns:a16="http://schemas.microsoft.com/office/drawing/2014/main" xmlns="" id="{741C93D2-DDDB-4D19-9772-0CA10564AD25}"/>
+                <a16:creationId xmlns="" xmlns:a16="http://schemas.microsoft.com/office/drawing/2014/main" id="{741C93D2-DDDB-4D19-9772-0CA10564AD25}"/>
               </a:ext>
             </a:extLst>
           </p:cNvPr>
@@ -4069,7 +4069,7 @@
           <p:cNvPr id="2" name="Title 1">
             <a:extLst>
               <a:ext uri="{FF2B5EF4-FFF2-40B4-BE49-F238E27FC236}">
-                <a16:creationId xmlns:a16="http://schemas.microsoft.com/office/drawing/2014/main" xmlns="" id="{A493CC4A-EBB0-4BD8-A96E-3B4C673655A9}"/>
+                <a16:creationId xmlns="" xmlns:a16="http://schemas.microsoft.com/office/drawing/2014/main" id="{A493CC4A-EBB0-4BD8-A96E-3B4C673655A9}"/>
               </a:ext>
             </a:extLst>
           </p:cNvPr>
@@ -4097,7 +4097,7 @@
           <p:cNvPr id="3" name="Content Placeholder 2">
             <a:extLst>
               <a:ext uri="{FF2B5EF4-FFF2-40B4-BE49-F238E27FC236}">
-                <a16:creationId xmlns:a16="http://schemas.microsoft.com/office/drawing/2014/main" xmlns="" id="{CE7F0586-6903-40C8-923A-175A321389AB}"/>
+                <a16:creationId xmlns="" xmlns:a16="http://schemas.microsoft.com/office/drawing/2014/main" id="{CE7F0586-6903-40C8-923A-175A321389AB}"/>
               </a:ext>
             </a:extLst>
           </p:cNvPr>
@@ -4187,7 +4187,7 @@
           <p:cNvPr id="2" name="Title 1">
             <a:extLst>
               <a:ext uri="{FF2B5EF4-FFF2-40B4-BE49-F238E27FC236}">
-                <a16:creationId xmlns:a16="http://schemas.microsoft.com/office/drawing/2014/main" xmlns="" id="{7B215422-0B80-46C1-9386-97DBAF52385F}"/>
+                <a16:creationId xmlns="" xmlns:a16="http://schemas.microsoft.com/office/drawing/2014/main" id="{7B215422-0B80-46C1-9386-97DBAF52385F}"/>
               </a:ext>
             </a:extLst>
           </p:cNvPr>
@@ -4215,7 +4215,7 @@
           <p:cNvPr id="4" name="Content Placeholder 2">
             <a:extLst>
               <a:ext uri="{FF2B5EF4-FFF2-40B4-BE49-F238E27FC236}">
-                <a16:creationId xmlns:a16="http://schemas.microsoft.com/office/drawing/2014/main" xmlns="" id="{FB6E75DC-BCAA-43B6-AF9C-4DF22E7672B9}"/>
+                <a16:creationId xmlns="" xmlns:a16="http://schemas.microsoft.com/office/drawing/2014/main" id="{FB6E75DC-BCAA-43B6-AF9C-4DF22E7672B9}"/>
               </a:ext>
             </a:extLst>
           </p:cNvPr>
@@ -4523,7 +4523,7 @@
           <p:cNvPr id="2" name="Title 1">
             <a:extLst>
               <a:ext uri="{FF2B5EF4-FFF2-40B4-BE49-F238E27FC236}">
-                <a16:creationId xmlns:a16="http://schemas.microsoft.com/office/drawing/2014/main" xmlns="" id="{2499EEC0-ADED-4DAB-9FFF-BD4EF3331D09}"/>
+                <a16:creationId xmlns="" xmlns:a16="http://schemas.microsoft.com/office/drawing/2014/main" id="{2499EEC0-ADED-4DAB-9FFF-BD4EF3331D09}"/>
               </a:ext>
             </a:extLst>
           </p:cNvPr>
@@ -4551,7 +4551,7 @@
           <p:cNvPr id="3" name="Content Placeholder 2">
             <a:extLst>
               <a:ext uri="{FF2B5EF4-FFF2-40B4-BE49-F238E27FC236}">
-                <a16:creationId xmlns:a16="http://schemas.microsoft.com/office/drawing/2014/main" xmlns="" id="{46DD1B97-7EFF-471F-BE41-8BB8FB075506}"/>
+                <a16:creationId xmlns="" xmlns:a16="http://schemas.microsoft.com/office/drawing/2014/main" id="{46DD1B97-7EFF-471F-BE41-8BB8FB075506}"/>
               </a:ext>
             </a:extLst>
           </p:cNvPr>
@@ -4632,7 +4632,7 @@
           <p:cNvPr id="2" name="Title 1">
             <a:extLst>
               <a:ext uri="{FF2B5EF4-FFF2-40B4-BE49-F238E27FC236}">
-                <a16:creationId xmlns:a16="http://schemas.microsoft.com/office/drawing/2014/main" xmlns="" id="{2499EEC0-ADED-4DAB-9FFF-BD4EF3331D09}"/>
+                <a16:creationId xmlns="" xmlns:a16="http://schemas.microsoft.com/office/drawing/2014/main" id="{2499EEC0-ADED-4DAB-9FFF-BD4EF3331D09}"/>
               </a:ext>
             </a:extLst>
           </p:cNvPr>
@@ -4660,7 +4660,7 @@
           <p:cNvPr id="3" name="Content Placeholder 2">
             <a:extLst>
               <a:ext uri="{FF2B5EF4-FFF2-40B4-BE49-F238E27FC236}">
-                <a16:creationId xmlns:a16="http://schemas.microsoft.com/office/drawing/2014/main" xmlns="" id="{46DD1B97-7EFF-471F-BE41-8BB8FB075506}"/>
+                <a16:creationId xmlns="" xmlns:a16="http://schemas.microsoft.com/office/drawing/2014/main" id="{46DD1B97-7EFF-471F-BE41-8BB8FB075506}"/>
               </a:ext>
             </a:extLst>
           </p:cNvPr>
@@ -4673,12 +4673,23 @@
         </p:nvSpPr>
         <p:spPr/>
         <p:txBody>
-          <a:bodyPr/>
+          <a:bodyPr>
+            <a:normAutofit lnSpcReduction="10000"/>
+          </a:bodyPr>
           <a:lstStyle/>
           <a:p>
+            <a:pPr algn="just"/>
+            <a:r>
+              <a:rPr lang="en-US" sz="2800" dirty="0"/>
+              <a:t>G</a:t>
+            </a:r>
             <a:r>
               <a:rPr lang="en-US" sz="2800" dirty="0" smtClean="0"/>
-              <a:t>Randomly generate a Sudoku Matrix each time: generate a random full-matrix </a:t>
+              <a:t>enerate random Sudoku: </a:t>
+            </a:r>
+            <a:r>
+              <a:rPr lang="en-US" sz="2800" dirty="0" smtClean="0"/>
+              <a:t>generate a random full-matrix </a:t>
             </a:r>
             <a:r>
               <a:rPr lang="en-US" sz="2800" dirty="0"/>
@@ -4686,28 +4697,71 @@
             </a:r>
             <a:r>
               <a:rPr lang="en-US" sz="2800" dirty="0" smtClean="0"/>
-              <a:t>udoku and then remove element in the matrix and make sure always a unique solution.</a:t>
-            </a:r>
-          </a:p>
-          <a:p>
+              <a:t>udoku and then remove element in the matrix </a:t>
+            </a:r>
             <a:r>
               <a:rPr lang="en-US" sz="2800" dirty="0" smtClean="0"/>
-              <a:t>Give user one step hint.</a:t>
-            </a:r>
-          </a:p>
-          <a:p>
+              <a:t>iteratively and </a:t>
+            </a:r>
             <a:r>
               <a:rPr lang="en-US" sz="2800" dirty="0" smtClean="0"/>
-              <a:t>Solve the problem when user input incorrect word.</a:t>
-            </a:r>
-          </a:p>
-          <a:p>
+              <a:t>make sure always a unique </a:t>
+            </a:r>
             <a:r>
               <a:rPr lang="en-US" sz="2800" dirty="0" smtClean="0"/>
-              <a:t>Able to show the result by using the solve method in the backend. </a:t>
-            </a:r>
-          </a:p>
-          <a:p>
+              <a:t>solution by using solve method. We speed it up by applying Algorithm X method to solve </a:t>
+            </a:r>
+            <a:r>
+              <a:rPr lang="en-US" sz="2800" dirty="0" err="1" smtClean="0"/>
+              <a:t>sudoku</a:t>
+            </a:r>
+            <a:r>
+              <a:rPr lang="en-US" sz="2800" dirty="0" smtClean="0"/>
+              <a:t>.</a:t>
+            </a:r>
+            <a:endParaRPr lang="en-US" sz="2800" dirty="0" smtClean="0"/>
+          </a:p>
+          <a:p>
+            <a:pPr algn="just"/>
+            <a:r>
+              <a:rPr lang="en-US" sz="2800" dirty="0" smtClean="0"/>
+              <a:t>Give user one step </a:t>
+            </a:r>
+            <a:r>
+              <a:rPr lang="en-US" sz="2800" dirty="0" smtClean="0"/>
+              <a:t>hint</a:t>
+            </a:r>
+            <a:r>
+              <a:rPr lang="en-US" sz="2800" dirty="0"/>
+              <a:t> </a:t>
+            </a:r>
+            <a:r>
+              <a:rPr lang="en-US" sz="2800" dirty="0" smtClean="0"/>
+              <a:t>and able to recognize incorrect input</a:t>
+            </a:r>
+            <a:endParaRPr lang="en-US" sz="2800" dirty="0" smtClean="0"/>
+          </a:p>
+          <a:p>
+            <a:pPr algn="just"/>
+            <a:r>
+              <a:rPr lang="en-US" sz="2800" dirty="0" smtClean="0"/>
+              <a:t>Able to show </a:t>
+            </a:r>
+            <a:r>
+              <a:rPr lang="en-US" sz="2800" dirty="0" smtClean="0"/>
+              <a:t>and </a:t>
+            </a:r>
+            <a:r>
+              <a:rPr lang="en-US" sz="2800" smtClean="0"/>
+              <a:t>check user’s result </a:t>
+            </a:r>
+            <a:r>
+              <a:rPr lang="en-US" sz="2800" dirty="0" smtClean="0"/>
+              <a:t>by using the solve method in the backend. </a:t>
+            </a:r>
+          </a:p>
+          <a:p>
+            <a:pPr algn="just"/>
             <a:endParaRPr lang="en-US" sz="2800" dirty="0"/>
           </a:p>
         </p:txBody>
@@ -4747,7 +4801,7 @@
           <p:cNvPr id="2" name="Title 1">
             <a:extLst>
               <a:ext uri="{FF2B5EF4-FFF2-40B4-BE49-F238E27FC236}">
-                <a16:creationId xmlns:a16="http://schemas.microsoft.com/office/drawing/2014/main" xmlns="" id="{2499EEC0-ADED-4DAB-9FFF-BD4EF3331D09}"/>
+                <a16:creationId xmlns="" xmlns:a16="http://schemas.microsoft.com/office/drawing/2014/main" id="{2499EEC0-ADED-4DAB-9FFF-BD4EF3331D09}"/>
               </a:ext>
             </a:extLst>
           </p:cNvPr>
@@ -4775,7 +4829,7 @@
           <p:cNvPr id="3" name="Content Placeholder 2">
             <a:extLst>
               <a:ext uri="{FF2B5EF4-FFF2-40B4-BE49-F238E27FC236}">
-                <a16:creationId xmlns:a16="http://schemas.microsoft.com/office/drawing/2014/main" xmlns="" id="{46DD1B97-7EFF-471F-BE41-8BB8FB075506}"/>
+                <a16:creationId xmlns="" xmlns:a16="http://schemas.microsoft.com/office/drawing/2014/main" id="{46DD1B97-7EFF-471F-BE41-8BB8FB075506}"/>
               </a:ext>
             </a:extLst>
           </p:cNvPr>
@@ -4902,7 +4956,7 @@
           <p:cNvPr id="2" name="Title 1">
             <a:extLst>
               <a:ext uri="{FF2B5EF4-FFF2-40B4-BE49-F238E27FC236}">
-                <a16:creationId xmlns:a16="http://schemas.microsoft.com/office/drawing/2014/main" xmlns="" id="{B4149283-99B6-4902-B7D6-B5589435A97F}"/>
+                <a16:creationId xmlns="" xmlns:a16="http://schemas.microsoft.com/office/drawing/2014/main" id="{B4149283-99B6-4902-B7D6-B5589435A97F}"/>
               </a:ext>
             </a:extLst>
           </p:cNvPr>
@@ -4930,7 +4984,7 @@
           <p:cNvPr id="3" name="Content Placeholder 2">
             <a:extLst>
               <a:ext uri="{FF2B5EF4-FFF2-40B4-BE49-F238E27FC236}">
-                <a16:creationId xmlns:a16="http://schemas.microsoft.com/office/drawing/2014/main" xmlns="" id="{6C46C808-68B7-4006-A949-C6738A253D64}"/>
+                <a16:creationId xmlns="" xmlns:a16="http://schemas.microsoft.com/office/drawing/2014/main" id="{6C46C808-68B7-4006-A949-C6738A253D64}"/>
               </a:ext>
             </a:extLst>
           </p:cNvPr>

</xml_diff>